<commit_message>
Updated screen captures, readme.md, and presentation PPTx.
</commit_message>
<xml_diff>
--- a/public/assets/Auto-Tracker-Presentation.pptx
+++ b/public/assets/Auto-Tracker-Presentation.pptx
@@ -1400,7 +1400,83 @@
                 <a:cs typeface="Times New Roman"/>
                 <a:sym typeface="Times New Roman"/>
               </a:rPr>
-              <a:t>The user story</a:t>
+              <a:t>The user story.</a:t>
+            </a:r>
+          </a:p>
+          <a:p>
+            <a:pPr marL="457200" lvl="0" indent="-317500" algn="l" rtl="0">
+              <a:lnSpc>
+                <a:spcPct val="100000"/>
+              </a:lnSpc>
+              <a:spcBef>
+                <a:spcPts val="0"/>
+              </a:spcBef>
+              <a:spcAft>
+                <a:spcPts val="0"/>
+              </a:spcAft>
+              <a:buSzPts val="1400"/>
+              <a:buFont typeface="Times New Roman"/>
+              <a:buChar char="●"/>
+            </a:pPr>
+            <a:r>
+              <a:rPr lang="en-US" sz="1400" dirty="0">
+                <a:solidFill>
+                  <a:srgbClr val="111111"/>
+                </a:solidFill>
+                <a:highlight>
+                  <a:srgbClr val="FFFFFF"/>
+                </a:highlight>
+                <a:latin typeface="Times New Roman"/>
+                <a:ea typeface="Times New Roman"/>
+                <a:cs typeface="Times New Roman"/>
+                <a:sym typeface="Times New Roman"/>
+              </a:rPr>
+              <a:t>Vehicle: </a:t>
+            </a:r>
+            <a:r>
+              <a:rPr lang="en-US" sz="1400" dirty="0" err="1">
+                <a:solidFill>
+                  <a:srgbClr val="111111"/>
+                </a:solidFill>
+                <a:highlight>
+                  <a:srgbClr val="FFFFFF"/>
+                </a:highlight>
+                <a:latin typeface="Times New Roman"/>
+                <a:ea typeface="Times New Roman"/>
+                <a:cs typeface="Times New Roman"/>
+                <a:sym typeface="Times New Roman"/>
+              </a:rPr>
+              <a:t>Ferarri</a:t>
+            </a:r>
+            <a:r>
+              <a:rPr lang="en-US" sz="1400" dirty="0">
+                <a:solidFill>
+                  <a:srgbClr val="111111"/>
+                </a:solidFill>
+                <a:highlight>
+                  <a:srgbClr val="FFFFFF"/>
+                </a:highlight>
+                <a:latin typeface="Times New Roman"/>
+                <a:ea typeface="Times New Roman"/>
+                <a:cs typeface="Times New Roman"/>
+                <a:sym typeface="Times New Roman"/>
+              </a:rPr>
+              <a:t> 488 </a:t>
+            </a:r>
+            <a:r>
+              <a:rPr lang="en-US" sz="1400" dirty="0" err="1">
+                <a:solidFill>
+                  <a:srgbClr val="111111"/>
+                </a:solidFill>
+                <a:highlight>
+                  <a:srgbClr val="FFFFFF"/>
+                </a:highlight>
+                <a:latin typeface="Times New Roman"/>
+                <a:ea typeface="Times New Roman"/>
+                <a:cs typeface="Times New Roman"/>
+                <a:sym typeface="Times New Roman"/>
+              </a:rPr>
+              <a:t>Pista</a:t>
             </a:r>
             <a:endParaRPr sz="1400" dirty="0">
               <a:solidFill>
@@ -1588,6 +1664,67 @@
               <a:t>The motivation for development</a:t>
             </a:r>
           </a:p>
+          <a:p>
+            <a:pPr marL="457200" lvl="0" indent="-317500" algn="l" rtl="0">
+              <a:lnSpc>
+                <a:spcPct val="100000"/>
+              </a:lnSpc>
+              <a:spcBef>
+                <a:spcPts val="0"/>
+              </a:spcBef>
+              <a:spcAft>
+                <a:spcPts val="0"/>
+              </a:spcAft>
+              <a:buSzPts val="1400"/>
+              <a:buFont typeface="Times New Roman"/>
+              <a:buChar char="●"/>
+            </a:pPr>
+            <a:r>
+              <a:rPr lang="en-US" sz="1400" dirty="0">
+                <a:solidFill>
+                  <a:srgbClr val="111111"/>
+                </a:solidFill>
+                <a:highlight>
+                  <a:srgbClr val="FFFFFF"/>
+                </a:highlight>
+                <a:latin typeface="Times New Roman"/>
+                <a:ea typeface="Times New Roman"/>
+                <a:cs typeface="Times New Roman"/>
+                <a:sym typeface="Times New Roman"/>
+              </a:rPr>
+              <a:t>Vehicle: Lamborghini </a:t>
+            </a:r>
+            <a:r>
+              <a:rPr lang="en-US" sz="1400" dirty="0" err="1">
+                <a:solidFill>
+                  <a:srgbClr val="111111"/>
+                </a:solidFill>
+                <a:highlight>
+                  <a:srgbClr val="FFFFFF"/>
+                </a:highlight>
+                <a:latin typeface="Times New Roman"/>
+                <a:ea typeface="Times New Roman"/>
+                <a:cs typeface="Times New Roman"/>
+                <a:sym typeface="Times New Roman"/>
+              </a:rPr>
+              <a:t>Aventador</a:t>
+            </a:r>
+            <a:r>
+              <a:rPr lang="en-US" sz="1400" dirty="0">
+                <a:solidFill>
+                  <a:srgbClr val="111111"/>
+                </a:solidFill>
+                <a:highlight>
+                  <a:srgbClr val="FFFFFF"/>
+                </a:highlight>
+                <a:latin typeface="Times New Roman"/>
+                <a:ea typeface="Times New Roman"/>
+                <a:cs typeface="Times New Roman"/>
+                <a:sym typeface="Times New Roman"/>
+              </a:rPr>
+              <a:t> SVJ</a:t>
+            </a:r>
+          </a:p>
         </p:txBody>
       </p:sp>
       <p:sp>
@@ -1714,18 +1851,21 @@
               <a:buFont typeface="Times New Roman"/>
               <a:buChar char="●"/>
             </a:pPr>
-            <a:endParaRPr lang="en-US" sz="1400" dirty="0">
-              <a:solidFill>
-                <a:srgbClr val="111111"/>
-              </a:solidFill>
-              <a:highlight>
-                <a:srgbClr val="FFFFFF"/>
-              </a:highlight>
-              <a:latin typeface="Times New Roman"/>
-              <a:ea typeface="Times New Roman"/>
-              <a:cs typeface="Times New Roman"/>
-              <a:sym typeface="Times New Roman"/>
-            </a:endParaRPr>
+            <a:r>
+              <a:rPr lang="en-US" sz="1400" dirty="0">
+                <a:solidFill>
+                  <a:srgbClr val="111111"/>
+                </a:solidFill>
+                <a:highlight>
+                  <a:srgbClr val="FFFFFF"/>
+                </a:highlight>
+                <a:latin typeface="Times New Roman"/>
+                <a:ea typeface="Times New Roman"/>
+                <a:cs typeface="Times New Roman"/>
+                <a:sym typeface="Times New Roman"/>
+              </a:rPr>
+              <a:t>Vehicle: James Bond Austin Martin D85</a:t>
+            </a:r>
           </a:p>
         </p:txBody>
       </p:sp>
@@ -1899,6 +2039,37 @@
               </a:rPr>
               <a:t>Discuss how a user would use the application.</a:t>
             </a:r>
+          </a:p>
+          <a:p>
+            <a:pPr marL="457200" lvl="0" indent="-317500" algn="l" rtl="0">
+              <a:lnSpc>
+                <a:spcPct val="100000"/>
+              </a:lnSpc>
+              <a:spcBef>
+                <a:spcPts val="0"/>
+              </a:spcBef>
+              <a:spcAft>
+                <a:spcPts val="0"/>
+              </a:spcAft>
+              <a:buSzPts val="1400"/>
+              <a:buFont typeface="Times New Roman"/>
+              <a:buChar char="●"/>
+            </a:pPr>
+            <a:r>
+              <a:rPr lang="en-US" sz="1400" dirty="0">
+                <a:solidFill>
+                  <a:srgbClr val="111111"/>
+                </a:solidFill>
+                <a:highlight>
+                  <a:srgbClr val="FFFFFF"/>
+                </a:highlight>
+                <a:latin typeface="Times New Roman"/>
+                <a:ea typeface="Times New Roman"/>
+                <a:cs typeface="Times New Roman"/>
+                <a:sym typeface="Times New Roman"/>
+              </a:rPr>
+              <a:t>Vehicle: generic family van</a:t>
+            </a:r>
             <a:endParaRPr sz="1400" dirty="0">
               <a:solidFill>
                 <a:srgbClr val="111111"/>
@@ -2051,7 +2222,38 @@
                 <a:cs typeface="Times New Roman"/>
                 <a:sym typeface="Times New Roman"/>
               </a:rPr>
-              <a:t>A live demo of the application</a:t>
+              <a:t>A live demo of the application.</a:t>
+            </a:r>
+          </a:p>
+          <a:p>
+            <a:pPr marL="457200" lvl="0" indent="-317500" algn="l" rtl="0">
+              <a:lnSpc>
+                <a:spcPct val="100000"/>
+              </a:lnSpc>
+              <a:spcBef>
+                <a:spcPts val="0"/>
+              </a:spcBef>
+              <a:spcAft>
+                <a:spcPts val="0"/>
+              </a:spcAft>
+              <a:buSzPts val="1400"/>
+              <a:buFont typeface="Times New Roman"/>
+              <a:buChar char="●"/>
+            </a:pPr>
+            <a:r>
+              <a:rPr lang="en-US" sz="1400" dirty="0">
+                <a:solidFill>
+                  <a:srgbClr val="111111"/>
+                </a:solidFill>
+                <a:highlight>
+                  <a:srgbClr val="FFFFFF"/>
+                </a:highlight>
+                <a:latin typeface="Times New Roman"/>
+                <a:ea typeface="Times New Roman"/>
+                <a:cs typeface="Times New Roman"/>
+                <a:sym typeface="Times New Roman"/>
+              </a:rPr>
+              <a:t>Vehicle: The Munster’s car</a:t>
             </a:r>
           </a:p>
         </p:txBody>
@@ -2196,6 +2398,37 @@
               <a:t>This slide discusses ideas and improvements that could be made in a future version of the application.</a:t>
             </a:r>
           </a:p>
+          <a:p>
+            <a:pPr marL="457200" lvl="0" indent="-317500" algn="l" rtl="0">
+              <a:lnSpc>
+                <a:spcPct val="100000"/>
+              </a:lnSpc>
+              <a:spcBef>
+                <a:spcPts val="0"/>
+              </a:spcBef>
+              <a:spcAft>
+                <a:spcPts val="0"/>
+              </a:spcAft>
+              <a:buSzPts val="1400"/>
+              <a:buFont typeface="Times New Roman"/>
+              <a:buChar char="●"/>
+            </a:pPr>
+            <a:r>
+              <a:rPr lang="en-US" sz="1400" dirty="0">
+                <a:solidFill>
+                  <a:srgbClr val="111111"/>
+                </a:solidFill>
+                <a:highlight>
+                  <a:srgbClr val="FFFFFF"/>
+                </a:highlight>
+                <a:latin typeface="Times New Roman"/>
+                <a:ea typeface="Times New Roman"/>
+                <a:cs typeface="Times New Roman"/>
+                <a:sym typeface="Times New Roman"/>
+              </a:rPr>
+              <a:t>Vehicle: Porsche Cayman</a:t>
+            </a:r>
+          </a:p>
         </p:txBody>
       </p:sp>
       <p:sp>
@@ -2336,6 +2569,37 @@
                 <a:sym typeface="Times New Roman"/>
               </a:rPr>
               <a:t>This slide shows the links to the “live” application on Heroku as well as the GitHub repository.</a:t>
+            </a:r>
+          </a:p>
+          <a:p>
+            <a:pPr marL="457200" lvl="0" indent="-317500" algn="l" rtl="0">
+              <a:lnSpc>
+                <a:spcPct val="100000"/>
+              </a:lnSpc>
+              <a:spcBef>
+                <a:spcPts val="0"/>
+              </a:spcBef>
+              <a:spcAft>
+                <a:spcPts val="0"/>
+              </a:spcAft>
+              <a:buSzPts val="1400"/>
+              <a:buFont typeface="Times New Roman"/>
+              <a:buChar char="●"/>
+            </a:pPr>
+            <a:r>
+              <a:rPr lang="en-US" sz="1400" dirty="0">
+                <a:solidFill>
+                  <a:srgbClr val="111111"/>
+                </a:solidFill>
+                <a:highlight>
+                  <a:srgbClr val="FFFFFF"/>
+                </a:highlight>
+                <a:latin typeface="Times New Roman"/>
+                <a:ea typeface="Times New Roman"/>
+                <a:cs typeface="Times New Roman"/>
+                <a:sym typeface="Times New Roman"/>
+              </a:rPr>
+              <a:t>Vehicle: GMC Yukon XL</a:t>
             </a:r>
             <a:endParaRPr sz="1400" dirty="0">
               <a:solidFill>
@@ -16036,53 +16300,6 @@
           </a:p>
         </p:txBody>
       </p:sp>
-      <p:pic>
-        <p:nvPicPr>
-          <p:cNvPr id="1030" name="Picture 6" descr="Ferrari's first plug-in hybrid supercar is one of its most powerful cars  ever - CNN">
-            <a:extLst>
-              <a:ext uri="{FF2B5EF4-FFF2-40B4-BE49-F238E27FC236}">
-                <a16:creationId xmlns:a16="http://schemas.microsoft.com/office/drawing/2014/main" id="{51FC9FC3-AD0B-47A4-B225-E9C9E04049FE}"/>
-              </a:ext>
-            </a:extLst>
-          </p:cNvPr>
-          <p:cNvPicPr>
-            <a:picLocks noChangeAspect="1" noChangeArrowheads="1"/>
-          </p:cNvPicPr>
-          <p:nvPr/>
-        </p:nvPicPr>
-        <p:blipFill>
-          <a:blip r:embed="rId3">
-            <a:extLst>
-              <a:ext uri="{28A0092B-C50C-407E-A947-70E740481C1C}">
-                <a14:useLocalDpi xmlns:a14="http://schemas.microsoft.com/office/drawing/2010/main" val="0"/>
-              </a:ext>
-            </a:extLst>
-          </a:blip>
-          <a:srcRect/>
-          <a:stretch>
-            <a:fillRect/>
-          </a:stretch>
-        </p:blipFill>
-        <p:spPr bwMode="auto">
-          <a:xfrm>
-            <a:off x="6112808" y="5086410"/>
-            <a:ext cx="2612091" cy="1466790"/>
-          </a:xfrm>
-          <a:prstGeom prst="rect">
-            <a:avLst/>
-          </a:prstGeom>
-          <a:noFill/>
-          <a:extLst>
-            <a:ext uri="{909E8E84-426E-40DD-AFC4-6F175D3DCCD1}">
-              <a14:hiddenFill xmlns:a14="http://schemas.microsoft.com/office/drawing/2010/main">
-                <a:solidFill>
-                  <a:srgbClr val="FFFFFF"/>
-                </a:solidFill>
-              </a14:hiddenFill>
-            </a:ext>
-          </a:extLst>
-        </p:spPr>
-      </p:pic>
       <p:sp>
         <p:nvSpPr>
           <p:cNvPr id="2" name="TextBox 1">
@@ -16186,6 +16403,53 @@
           </a:p>
         </p:txBody>
       </p:sp>
+      <p:pic>
+        <p:nvPicPr>
+          <p:cNvPr id="1026" name="Picture 2" descr="Ferrari 488 Pista | Forza Wiki | Fandom">
+            <a:extLst>
+              <a:ext uri="{FF2B5EF4-FFF2-40B4-BE49-F238E27FC236}">
+                <a16:creationId xmlns:a16="http://schemas.microsoft.com/office/drawing/2014/main" id="{42C6DB8C-9FEB-42FA-AFFB-014DD6FFE065}"/>
+              </a:ext>
+            </a:extLst>
+          </p:cNvPr>
+          <p:cNvPicPr>
+            <a:picLocks noChangeAspect="1" noChangeArrowheads="1"/>
+          </p:cNvPicPr>
+          <p:nvPr/>
+        </p:nvPicPr>
+        <p:blipFill>
+          <a:blip r:embed="rId3">
+            <a:extLst>
+              <a:ext uri="{28A0092B-C50C-407E-A947-70E740481C1C}">
+                <a14:useLocalDpi xmlns:a14="http://schemas.microsoft.com/office/drawing/2010/main" val="0"/>
+              </a:ext>
+            </a:extLst>
+          </a:blip>
+          <a:srcRect/>
+          <a:stretch>
+            <a:fillRect/>
+          </a:stretch>
+        </p:blipFill>
+        <p:spPr bwMode="auto">
+          <a:xfrm>
+            <a:off x="5676900" y="4672135"/>
+            <a:ext cx="3086100" cy="1739682"/>
+          </a:xfrm>
+          <a:prstGeom prst="rect">
+            <a:avLst/>
+          </a:prstGeom>
+          <a:noFill/>
+          <a:extLst>
+            <a:ext uri="{909E8E84-426E-40DD-AFC4-6F175D3DCCD1}">
+              <a14:hiddenFill xmlns:a14="http://schemas.microsoft.com/office/drawing/2010/main">
+                <a:solidFill>
+                  <a:srgbClr val="FFFFFF"/>
+                </a:solidFill>
+              </a14:hiddenFill>
+            </a:ext>
+          </a:extLst>
+        </p:spPr>
+      </p:pic>
     </p:spTree>
     <p:extLst>
       <p:ext uri="{BB962C8B-B14F-4D97-AF65-F5344CB8AC3E}">
@@ -17513,8 +17777,8 @@
         </p:nvSpPr>
         <p:spPr>
           <a:xfrm>
-            <a:off x="380999" y="1912882"/>
-            <a:ext cx="8382001" cy="4498935"/>
+            <a:off x="381000" y="1912882"/>
+            <a:ext cx="3288938" cy="4498935"/>
           </a:xfrm>
           <a:prstGeom prst="rect">
             <a:avLst/>
@@ -17531,9 +17795,6 @@
           <a:lstStyle/>
           <a:p>
             <a:pPr marR="0" lvl="0" algn="l" rtl="0">
-              <a:lnSpc>
-                <a:spcPct val="150000"/>
-              </a:lnSpc>
               <a:spcBef>
                 <a:spcPts val="0"/>
               </a:spcBef>
@@ -17547,14 +17808,15 @@
             </a:pPr>
             <a:r>
               <a:rPr lang="en-US" sz="1600" dirty="0"/>
-              <a:t>It is expected that an owner/user would implement this application by:</a:t>
+              <a:t>An owner/user would implement this application by:</a:t>
             </a:r>
+            <a:br>
+              <a:rPr lang="en-US" sz="1600" dirty="0"/>
+            </a:br>
+            <a:endParaRPr lang="en-US" sz="1600" dirty="0"/>
           </a:p>
           <a:p>
             <a:pPr marL="285750" marR="0" lvl="0" indent="-285750" algn="l" rtl="0">
-              <a:lnSpc>
-                <a:spcPct val="150000"/>
-              </a:lnSpc>
               <a:spcBef>
                 <a:spcPts val="0"/>
               </a:spcBef>
@@ -17572,12 +17834,13 @@
               <a:rPr lang="en-US" sz="1600" dirty="0"/>
               <a:t>Signing up.</a:t>
             </a:r>
+            <a:br>
+              <a:rPr lang="en-US" sz="1600" dirty="0"/>
+            </a:br>
+            <a:endParaRPr lang="en-US" sz="1600" dirty="0"/>
           </a:p>
           <a:p>
             <a:pPr marL="285750" marR="0" lvl="0" indent="-285750" algn="l" rtl="0">
-              <a:lnSpc>
-                <a:spcPct val="150000"/>
-              </a:lnSpc>
               <a:spcBef>
                 <a:spcPts val="0"/>
               </a:spcBef>
@@ -17595,12 +17858,13 @@
               <a:rPr lang="en-US" sz="1600" dirty="0"/>
               <a:t>Defining a number of authorized drivers.</a:t>
             </a:r>
+            <a:br>
+              <a:rPr lang="en-US" sz="1600" dirty="0"/>
+            </a:br>
+            <a:endParaRPr lang="en-US" sz="1600" dirty="0"/>
           </a:p>
           <a:p>
             <a:pPr marL="285750" marR="0" lvl="0" indent="-285750" algn="l" rtl="0">
-              <a:lnSpc>
-                <a:spcPct val="150000"/>
-              </a:lnSpc>
               <a:spcBef>
                 <a:spcPts val="0"/>
               </a:spcBef>
@@ -17618,12 +17882,13 @@
               <a:rPr lang="en-US" sz="1600" dirty="0"/>
               <a:t>Defining vehicle details.</a:t>
             </a:r>
+            <a:br>
+              <a:rPr lang="en-US" sz="1600" dirty="0"/>
+            </a:br>
+            <a:endParaRPr lang="en-US" sz="1600" dirty="0"/>
           </a:p>
           <a:p>
             <a:pPr marL="285750" marR="0" lvl="0" indent="-285750" algn="l" rtl="0">
-              <a:lnSpc>
-                <a:spcPct val="150000"/>
-              </a:lnSpc>
               <a:spcBef>
                 <a:spcPts val="0"/>
               </a:spcBef>
@@ -17690,7 +17955,7 @@
         </p:blipFill>
         <p:spPr bwMode="auto">
           <a:xfrm>
-            <a:off x="6678706" y="5272520"/>
+            <a:off x="380998" y="5177421"/>
             <a:ext cx="2084294" cy="1375779"/>
           </a:xfrm>
           <a:prstGeom prst="rect">
@@ -17706,6 +17971,36 @@
               </a14:hiddenFill>
             </a:ext>
           </a:extLst>
+        </p:spPr>
+      </p:pic>
+      <p:pic>
+        <p:nvPicPr>
+          <p:cNvPr id="3" name="Picture 2">
+            <a:extLst>
+              <a:ext uri="{FF2B5EF4-FFF2-40B4-BE49-F238E27FC236}">
+                <a16:creationId xmlns:a16="http://schemas.microsoft.com/office/drawing/2014/main" id="{D82AF572-A06E-40D3-BA3A-E06EA1C82A63}"/>
+              </a:ext>
+            </a:extLst>
+          </p:cNvPr>
+          <p:cNvPicPr>
+            <a:picLocks noChangeAspect="1"/>
+          </p:cNvPicPr>
+          <p:nvPr/>
+        </p:nvPicPr>
+        <p:blipFill>
+          <a:blip r:embed="rId4"/>
+          <a:stretch>
+            <a:fillRect/>
+          </a:stretch>
+        </p:blipFill>
+        <p:spPr>
+          <a:xfrm>
+            <a:off x="3577590" y="2028546"/>
+            <a:ext cx="5383262" cy="3081183"/>
+          </a:xfrm>
+          <a:prstGeom prst="rect">
+            <a:avLst/>
+          </a:prstGeom>
         </p:spPr>
       </p:pic>
     </p:spTree>
@@ -17942,8 +18237,8 @@
         </p:nvSpPr>
         <p:spPr>
           <a:xfrm>
-            <a:off x="381000" y="1676400"/>
-            <a:ext cx="6240137" cy="4498935"/>
+            <a:off x="381001" y="1676400"/>
+            <a:ext cx="2807969" cy="4498935"/>
           </a:xfrm>
           <a:prstGeom prst="rect">
             <a:avLst/>
@@ -18078,7 +18373,7 @@
         </p:blipFill>
         <p:spPr bwMode="auto">
           <a:xfrm>
-            <a:off x="6514509" y="5025929"/>
+            <a:off x="457200" y="5167312"/>
             <a:ext cx="2248491" cy="1385888"/>
           </a:xfrm>
           <a:prstGeom prst="rect">
@@ -18098,10 +18393,10 @@
       </p:pic>
       <p:pic>
         <p:nvPicPr>
-          <p:cNvPr id="3" name="Picture 2">
+          <p:cNvPr id="4" name="Picture 3">
             <a:extLst>
               <a:ext uri="{FF2B5EF4-FFF2-40B4-BE49-F238E27FC236}">
-                <a16:creationId xmlns:a16="http://schemas.microsoft.com/office/drawing/2014/main" id="{98959799-B558-43B6-9E5A-83BF92487900}"/>
+                <a16:creationId xmlns:a16="http://schemas.microsoft.com/office/drawing/2014/main" id="{EA366703-5A12-4131-BABD-D5FCB93E50EC}"/>
               </a:ext>
             </a:extLst>
           </p:cNvPr>
@@ -18118,8 +18413,8 @@
         </p:blipFill>
         <p:spPr>
           <a:xfrm>
-            <a:off x="766107" y="3931920"/>
-            <a:ext cx="5039507" cy="2751455"/>
+            <a:off x="3143116" y="2129377"/>
+            <a:ext cx="5619883" cy="3448463"/>
           </a:xfrm>
           <a:prstGeom prst="rect">
             <a:avLst/>
@@ -18510,10 +18805,10 @@
       </p:pic>
       <p:pic>
         <p:nvPicPr>
-          <p:cNvPr id="7" name="Picture 6">
+          <p:cNvPr id="3" name="Picture 2">
             <a:extLst>
               <a:ext uri="{FF2B5EF4-FFF2-40B4-BE49-F238E27FC236}">
-                <a16:creationId xmlns:a16="http://schemas.microsoft.com/office/drawing/2014/main" id="{60DF6BE6-3912-4CA5-9255-05D3B0546C2A}"/>
+                <a16:creationId xmlns:a16="http://schemas.microsoft.com/office/drawing/2014/main" id="{5A8EA9A8-7F34-4F23-8E33-E81D3C6B927A}"/>
               </a:ext>
             </a:extLst>
           </p:cNvPr>
@@ -18530,8 +18825,8 @@
         </p:blipFill>
         <p:spPr>
           <a:xfrm>
-            <a:off x="938074" y="3337560"/>
-            <a:ext cx="4491462" cy="3215640"/>
+            <a:off x="457200" y="3337987"/>
+            <a:ext cx="5349240" cy="3215213"/>
           </a:xfrm>
           <a:prstGeom prst="rect">
             <a:avLst/>

</xml_diff>

<commit_message>
Reworked presentation script, tweaked PPTx.
</commit_message>
<xml_diff>
--- a/public/assets/Auto-Tracker-Presentation.pptx
+++ b/public/assets/Auto-Tracker-Presentation.pptx
@@ -1661,7 +1661,7 @@
                 <a:cs typeface="Times New Roman"/>
                 <a:sym typeface="Times New Roman"/>
               </a:rPr>
-              <a:t>The motivation for development</a:t>
+              <a:t>The motivation for development is to always have vehicle information readily available.</a:t>
             </a:r>
           </a:p>
           <a:p>
@@ -15764,7 +15764,7 @@
         <p:spPr>
           <a:xfrm>
             <a:off x="380999" y="1912882"/>
-            <a:ext cx="8305800" cy="3090824"/>
+            <a:ext cx="5242561" cy="4640318"/>
           </a:xfrm>
           <a:prstGeom prst="rect">
             <a:avLst/>
@@ -15846,9 +15846,6 @@
           </a:p>
           <a:p>
             <a:pPr marL="285750" indent="-285750">
-              <a:lnSpc>
-                <a:spcPct val="200000"/>
-              </a:lnSpc>
               <a:buSzPts val="2800"/>
               <a:buFont typeface="Wingdings" panose="05000000000000000000" pitchFamily="2" charset="2"/>
               <a:buChar char="§"/>
@@ -15913,8 +15910,8 @@
         </p:blipFill>
         <p:spPr bwMode="auto">
           <a:xfrm>
-            <a:off x="6828336" y="5003706"/>
-            <a:ext cx="1858464" cy="1549494"/>
+            <a:off x="5699761" y="4062757"/>
+            <a:ext cx="2987039" cy="2490443"/>
           </a:xfrm>
           <a:prstGeom prst="rect">
             <a:avLst/>
@@ -17310,15 +17307,7 @@
             </a:pPr>
             <a:r>
               <a:rPr lang="en-US" dirty="0"/>
-              <a:t>The NPM package </a:t>
-            </a:r>
-            <a:r>
-              <a:rPr lang="en-US" dirty="0" err="1"/>
-              <a:t>Cloudinary</a:t>
-            </a:r>
-            <a:r>
-              <a:rPr lang="en-US" dirty="0"/>
-              <a:t>.</a:t>
+              <a:t>The NPM package AWS S3.</a:t>
             </a:r>
           </a:p>
           <a:p>
@@ -17457,7 +17446,7 @@
         <p:spPr>
           <a:xfrm>
             <a:off x="4983481" y="1919605"/>
-            <a:ext cx="3779519" cy="2523768"/>
+            <a:ext cx="3779519" cy="3170099"/>
           </a:xfrm>
           <a:prstGeom prst="rect">
             <a:avLst/>
@@ -17492,7 +17481,7 @@
             </a:pPr>
             <a:r>
               <a:rPr lang="en-US" dirty="0"/>
-              <a:t>Cameron laid out the application structure and framework.</a:t>
+              <a:t>Cameron laid out the application structure and framework, as well as the CSS and modals.</a:t>
             </a:r>
           </a:p>
           <a:p>
@@ -17507,7 +17496,7 @@
             </a:r>
             <a:r>
               <a:rPr lang="en-US" dirty="0"/>
-              <a:t> setup the routes.</a:t>
+              <a:t> setup the routes, editing functions, and session authorization.</a:t>
             </a:r>
           </a:p>
           <a:p>
@@ -17518,7 +17507,7 @@
             </a:pPr>
             <a:r>
               <a:rPr lang="en-US" dirty="0"/>
-              <a:t>Everyone contributed to coding (often in a group via Zoom.</a:t>
+              <a:t>Rich laid out the concept, the documentation, and worked on the handlebars, routes, and modals.</a:t>
             </a:r>
           </a:p>
           <a:p>
@@ -17529,9 +17518,8 @@
             </a:pPr>
             <a:r>
               <a:rPr lang="en-US" dirty="0"/>
-              <a:t>Rich laid out the concept, and the documentation, with editing and contributions from everyone.</a:t>
+              <a:t>Everyone contributed to coding (often in a group via Zoom).  We used pair program most of the time.</a:t>
             </a:r>
-            <a:endParaRPr lang="en-US" sz="1600" dirty="0"/>
           </a:p>
           <a:p>
             <a:pPr marL="571500" lvl="1" indent="-285750">

</xml_diff>

<commit_message>
updated css and reponsiveness. Added image upload for drivers
</commit_message>
<xml_diff>
--- a/public/assets/Auto-Tracker-Presentation.pptx
+++ b/public/assets/Auto-Tracker-Presentation.pptx
@@ -17318,6 +17318,44 @@
             </a:pPr>
             <a:r>
               <a:rPr lang="en-US" dirty="0"/>
+              <a:t>The NPM package </a:t>
+            </a:r>
+            <a:r>
+              <a:rPr lang="en-US" dirty="0" err="1"/>
+              <a:t>Multer</a:t>
+            </a:r>
+            <a:r>
+              <a:rPr lang="en-US" dirty="0"/>
+              <a:t>.</a:t>
+            </a:r>
+          </a:p>
+          <a:p>
+            <a:pPr marL="571500" lvl="1" indent="-285750">
+              <a:buSzPts val="2800"/>
+              <a:buFont typeface="Arial" panose="020B0604020202020204" pitchFamily="34" charset="0"/>
+              <a:buChar char="•"/>
+            </a:pPr>
+            <a:r>
+              <a:rPr lang="en-US" dirty="0"/>
+              <a:t>The NPM package </a:t>
+            </a:r>
+            <a:r>
+              <a:rPr lang="en-US" dirty="0" err="1"/>
+              <a:t>Multer</a:t>
+            </a:r>
+            <a:r>
+              <a:rPr lang="en-US" dirty="0"/>
+              <a:t> S3.</a:t>
+            </a:r>
+          </a:p>
+          <a:p>
+            <a:pPr marL="571500" lvl="1" indent="-285750">
+              <a:buSzPts val="2800"/>
+              <a:buFont typeface="Arial" panose="020B0604020202020204" pitchFamily="34" charset="0"/>
+              <a:buChar char="•"/>
+            </a:pPr>
+            <a:r>
+              <a:rPr lang="en-US" dirty="0"/>
               <a:t>The bootstrap API			</a:t>
             </a:r>
           </a:p>
@@ -17445,8 +17483,8 @@
         </p:nvSpPr>
         <p:spPr>
           <a:xfrm>
-            <a:off x="4983481" y="1919605"/>
-            <a:ext cx="3779519" cy="3170099"/>
+            <a:off x="4983481" y="1824106"/>
+            <a:ext cx="3779519" cy="3385542"/>
           </a:xfrm>
           <a:prstGeom prst="rect">
             <a:avLst/>
@@ -17481,7 +17519,7 @@
             </a:pPr>
             <a:r>
               <a:rPr lang="en-US" dirty="0"/>
-              <a:t>Cameron laid out the application structure and framework, as well as the CSS and modals.</a:t>
+              <a:t>Cameron laid out the application structure and framework, built the frontend, as well as the CSS and modals.</a:t>
             </a:r>
           </a:p>
           <a:p>

</xml_diff>

<commit_message>
updated Readme & pptx with delete/update functions
</commit_message>
<xml_diff>
--- a/public/assets/Auto-Tracker-Presentation.pptx
+++ b/public/assets/Auto-Tracker-Presentation.pptx
@@ -16342,8 +16342,8 @@
         </p:nvSpPr>
         <p:spPr>
           <a:xfrm>
-            <a:off x="5398771" y="1912882"/>
-            <a:ext cx="3364229" cy="1954894"/>
+            <a:off x="5252721" y="1912882"/>
+            <a:ext cx="3510280" cy="1954894"/>
           </a:xfrm>
           <a:prstGeom prst="rect">
             <a:avLst/>
@@ -16374,7 +16374,7 @@
             </a:pPr>
             <a:r>
               <a:rPr lang="en-US" sz="1600" dirty="0"/>
-              <a:t>Be able to add drivers.</a:t>
+              <a:t>Be able to add &amp; update drivers.</a:t>
             </a:r>
           </a:p>
           <a:p>
@@ -16387,7 +16387,7 @@
             </a:pPr>
             <a:r>
               <a:rPr lang="en-US" sz="1600" dirty="0"/>
-              <a:t>Be able to add vehicles</a:t>
+              <a:t>Be able to add &amp; update vehicles.</a:t>
             </a:r>
           </a:p>
           <a:p>
@@ -16797,7 +16797,7 @@
             </a:pPr>
             <a:r>
               <a:rPr lang="en-US" sz="1400" dirty="0"/>
-              <a:t>Owners can add and view vehicles.</a:t>
+              <a:t>Owners can add, view, update, and delete vehicles.</a:t>
             </a:r>
           </a:p>
           <a:p>
@@ -16808,7 +16808,7 @@
             </a:pPr>
             <a:r>
               <a:rPr lang="en-US" sz="1400" dirty="0"/>
-              <a:t>Owners can add and view drivers.</a:t>
+              <a:t>Owners can add, view, update, and delete drivers.</a:t>
             </a:r>
           </a:p>
           <a:p>
@@ -18305,7 +18305,7 @@
             </a:pPr>
             <a:r>
               <a:rPr lang="en-US" dirty="0"/>
-              <a:t>Add a vehicle.</a:t>
+              <a:t>Add a vehicle, update a vehicle, then delete it.</a:t>
             </a:r>
           </a:p>
           <a:p>
@@ -18793,7 +18793,7 @@
         <p:spPr>
           <a:xfrm>
             <a:off x="5669280" y="3497580"/>
-            <a:ext cx="3169921" cy="2031325"/>
+            <a:ext cx="3169921" cy="1292662"/>
           </a:xfrm>
           <a:prstGeom prst="rect">
             <a:avLst/>
@@ -18811,22 +18811,12 @@
               <a:buChar char="•"/>
             </a:pPr>
             <a:r>
-              <a:rPr lang="en-US" sz="1600" dirty="0"/>
-              <a:t>Function to delete  &amp; update vehicles &amp; drivers.</a:t>
+              <a:rPr lang="en-US" sz="1600"/>
+              <a:t>Add </a:t>
             </a:r>
-            <a:br>
-              <a:rPr lang="en-US" sz="1600" dirty="0"/>
-            </a:br>
-            <a:endParaRPr lang="en-US" sz="1600" dirty="0"/>
-          </a:p>
-          <a:p>
-            <a:pPr marL="285750" indent="-285750">
-              <a:buFont typeface="Arial" panose="020B0604020202020204" pitchFamily="34" charset="0"/>
-              <a:buChar char="•"/>
-            </a:pPr>
             <a:r>
               <a:rPr lang="en-US" sz="1600" dirty="0"/>
-              <a:t>Add calendar functionality.</a:t>
+              <a:t>calendar functionality.</a:t>
             </a:r>
             <a:br>
               <a:rPr lang="en-US" sz="1600" dirty="0"/>

</xml_diff>

<commit_message>
Updated screen shots, PPTx, and 'readme'.
</commit_message>
<xml_diff>
--- a/public/assets/Auto-Tracker-Presentation.pptx
+++ b/public/assets/Auto-Tracker-Presentation.pptx
@@ -16808,7 +16808,7 @@
             </a:pPr>
             <a:r>
               <a:rPr lang="en-US" sz="1400" dirty="0"/>
-              <a:t>Owners can add, view, update, and delete drivers.</a:t>
+              <a:t>Owners can add, view, and delete drivers. (There is no reason to update a driver.)</a:t>
             </a:r>
           </a:p>
           <a:p>
@@ -17253,7 +17253,7 @@
         <p:spPr>
           <a:xfrm>
             <a:off x="4983481" y="1824106"/>
-            <a:ext cx="3779519" cy="4678204"/>
+            <a:ext cx="3779519" cy="4893647"/>
           </a:xfrm>
           <a:prstGeom prst="rect">
             <a:avLst/>
@@ -17288,7 +17288,7 @@
             </a:pPr>
             <a:r>
               <a:rPr lang="en-US" dirty="0"/>
-              <a:t>Cameron laid out the application structure and framework, built the frontend, as well as the CSS and modals.</a:t>
+              <a:t>Cameron laid out the application structure and framework, built the frontend, as well as the CSS, icons,  and modals.</a:t>
             </a:r>
             <a:br>
               <a:rPr lang="en-US" dirty="0"/>
@@ -17322,7 +17322,7 @@
             </a:pPr>
             <a:r>
               <a:rPr lang="en-US" dirty="0"/>
-              <a:t>Rich laid out the concept, the documentation, and worked on the handlebars, routes, and modals.</a:t>
+              <a:t>Rich laid out the concept, the documentation, and worked on the handlebars, routes, modals, CSS, and icons.</a:t>
             </a:r>
             <a:br>
               <a:rPr lang="en-US" dirty="0"/>
@@ -17472,7 +17472,7 @@
         <p:spPr>
           <a:xfrm>
             <a:off x="381000" y="2171700"/>
-            <a:ext cx="2259329" cy="523220"/>
+            <a:ext cx="2259329" cy="738664"/>
           </a:xfrm>
           <a:prstGeom prst="rect">
             <a:avLst/>
@@ -17514,6 +17514,16 @@
             <a:r>
               <a:rPr lang="en-US" dirty="0"/>
               <a:t> S3</a:t>
+            </a:r>
+          </a:p>
+          <a:p>
+            <a:pPr marL="285750" indent="-285750">
+              <a:buFont typeface="Arial" panose="020B0604020202020204" pitchFamily="34" charset="0"/>
+              <a:buChar char="•"/>
+            </a:pPr>
+            <a:r>
+              <a:rPr lang="en-US" dirty="0"/>
+              <a:t>Method-Override</a:t>
             </a:r>
           </a:p>
         </p:txBody>
@@ -17950,10 +17960,10 @@
       </p:pic>
       <p:pic>
         <p:nvPicPr>
-          <p:cNvPr id="2" name="Picture 1">
+          <p:cNvPr id="4" name="Picture 3">
             <a:extLst>
               <a:ext uri="{FF2B5EF4-FFF2-40B4-BE49-F238E27FC236}">
-                <a16:creationId xmlns:a16="http://schemas.microsoft.com/office/drawing/2014/main" id="{700C48F3-2B6D-442B-A762-8DD4D2C909A6}"/>
+                <a16:creationId xmlns:a16="http://schemas.microsoft.com/office/drawing/2014/main" id="{E4023864-B0B8-4152-AB74-CF5D9FE0A017}"/>
               </a:ext>
             </a:extLst>
           </p:cNvPr>
@@ -17970,8 +17980,8 @@
         </p:blipFill>
         <p:spPr>
           <a:xfrm>
-            <a:off x="3982074" y="2034540"/>
-            <a:ext cx="4780926" cy="3703320"/>
+            <a:off x="3669938" y="2063174"/>
+            <a:ext cx="5093062" cy="3248108"/>
           </a:xfrm>
           <a:prstGeom prst="rect">
             <a:avLst/>
@@ -18368,10 +18378,10 @@
       </p:pic>
       <p:pic>
         <p:nvPicPr>
-          <p:cNvPr id="2" name="Picture 1">
+          <p:cNvPr id="4" name="Picture 3">
             <a:extLst>
               <a:ext uri="{FF2B5EF4-FFF2-40B4-BE49-F238E27FC236}">
-                <a16:creationId xmlns:a16="http://schemas.microsoft.com/office/drawing/2014/main" id="{552CE6C7-A357-4A24-B3B1-4A1E9E1F6099}"/>
+                <a16:creationId xmlns:a16="http://schemas.microsoft.com/office/drawing/2014/main" id="{E14AABA6-109F-413E-9E63-401B8551476A}"/>
               </a:ext>
             </a:extLst>
           </p:cNvPr>
@@ -18388,8 +18398,8 @@
         </p:blipFill>
         <p:spPr>
           <a:xfrm>
-            <a:off x="3551053" y="1874520"/>
-            <a:ext cx="5211946" cy="3723592"/>
+            <a:off x="3479799" y="2042675"/>
+            <a:ext cx="5283200" cy="3430252"/>
           </a:xfrm>
           <a:prstGeom prst="rect">
             <a:avLst/>
@@ -18844,10 +18854,10 @@
       </p:sp>
       <p:pic>
         <p:nvPicPr>
-          <p:cNvPr id="4" name="Picture 3">
+          <p:cNvPr id="5" name="Picture 4">
             <a:extLst>
               <a:ext uri="{FF2B5EF4-FFF2-40B4-BE49-F238E27FC236}">
-                <a16:creationId xmlns:a16="http://schemas.microsoft.com/office/drawing/2014/main" id="{B9441CF5-574E-422A-94A0-F8C81B0162E6}"/>
+                <a16:creationId xmlns:a16="http://schemas.microsoft.com/office/drawing/2014/main" id="{60C76238-5D51-4709-99C8-EAA073D08F0C}"/>
               </a:ext>
             </a:extLst>
           </p:cNvPr>
@@ -18864,8 +18874,8 @@
         </p:blipFill>
         <p:spPr>
           <a:xfrm>
-            <a:off x="457200" y="3253539"/>
-            <a:ext cx="4373969" cy="3299661"/>
+            <a:off x="396839" y="3399330"/>
+            <a:ext cx="4836160" cy="3153870"/>
           </a:xfrm>
           <a:prstGeom prst="rect">
             <a:avLst/>

</xml_diff>

<commit_message>
Updated screen shots, larger icons, and PPTx.
</commit_message>
<xml_diff>
--- a/public/assets/Auto-Tracker-Presentation.pptx
+++ b/public/assets/Auto-Tracker-Presentation.pptx
@@ -17960,10 +17960,10 @@
       </p:pic>
       <p:pic>
         <p:nvPicPr>
-          <p:cNvPr id="4" name="Picture 3">
+          <p:cNvPr id="3" name="Picture 2">
             <a:extLst>
               <a:ext uri="{FF2B5EF4-FFF2-40B4-BE49-F238E27FC236}">
-                <a16:creationId xmlns:a16="http://schemas.microsoft.com/office/drawing/2014/main" id="{E4023864-B0B8-4152-AB74-CF5D9FE0A017}"/>
+                <a16:creationId xmlns:a16="http://schemas.microsoft.com/office/drawing/2014/main" id="{1705C406-6129-47FF-B4CE-C36DEB33F071}"/>
               </a:ext>
             </a:extLst>
           </p:cNvPr>
@@ -17980,8 +17980,8 @@
         </p:blipFill>
         <p:spPr>
           <a:xfrm>
-            <a:off x="3669938" y="2063174"/>
-            <a:ext cx="5093062" cy="3248108"/>
+            <a:off x="3669938" y="2120588"/>
+            <a:ext cx="5093062" cy="3409468"/>
           </a:xfrm>
           <a:prstGeom prst="rect">
             <a:avLst/>
@@ -18378,10 +18378,10 @@
       </p:pic>
       <p:pic>
         <p:nvPicPr>
-          <p:cNvPr id="4" name="Picture 3">
+          <p:cNvPr id="3" name="Picture 2">
             <a:extLst>
               <a:ext uri="{FF2B5EF4-FFF2-40B4-BE49-F238E27FC236}">
-                <a16:creationId xmlns:a16="http://schemas.microsoft.com/office/drawing/2014/main" id="{E14AABA6-109F-413E-9E63-401B8551476A}"/>
+                <a16:creationId xmlns:a16="http://schemas.microsoft.com/office/drawing/2014/main" id="{8BAAEBC6-701A-4D23-BC92-7EA2D63C238E}"/>
               </a:ext>
             </a:extLst>
           </p:cNvPr>
@@ -18398,8 +18398,8 @@
         </p:blipFill>
         <p:spPr>
           <a:xfrm>
-            <a:off x="3479799" y="2042675"/>
-            <a:ext cx="5283200" cy="3430252"/>
+            <a:off x="3163056" y="2123440"/>
+            <a:ext cx="5599944" cy="3348600"/>
           </a:xfrm>
           <a:prstGeom prst="rect">
             <a:avLst/>
@@ -18854,10 +18854,10 @@
       </p:sp>
       <p:pic>
         <p:nvPicPr>
-          <p:cNvPr id="5" name="Picture 4">
+          <p:cNvPr id="4" name="Picture 3">
             <a:extLst>
               <a:ext uri="{FF2B5EF4-FFF2-40B4-BE49-F238E27FC236}">
-                <a16:creationId xmlns:a16="http://schemas.microsoft.com/office/drawing/2014/main" id="{60C76238-5D51-4709-99C8-EAA073D08F0C}"/>
+                <a16:creationId xmlns:a16="http://schemas.microsoft.com/office/drawing/2014/main" id="{5A6D97B4-BF8D-4A19-88E4-A1A980FC8BD0}"/>
               </a:ext>
             </a:extLst>
           </p:cNvPr>
@@ -18874,8 +18874,8 @@
         </p:blipFill>
         <p:spPr>
           <a:xfrm>
-            <a:off x="396839" y="3399330"/>
-            <a:ext cx="4836160" cy="3153870"/>
+            <a:off x="447636" y="3257540"/>
+            <a:ext cx="4784763" cy="3286238"/>
           </a:xfrm>
           <a:prstGeom prst="rect">
             <a:avLst/>

</xml_diff>